<commit_message>
Rm209 Fri Sensor Quiz
</commit_message>
<xml_diff>
--- a/Daily Agendas/Day12.3_ArduinoSensors6_Nov22.pptx
+++ b/Daily Agendas/Day12.3_ArduinoSensors6_Nov22.pptx
@@ -3204,6 +3204,13 @@
   <p:clrMapOvr>
     <a:masterClrMapping/>
   </p:clrMapOvr>
+  <p:timing>
+    <p:tnLst>
+      <p:par>
+        <p:cTn id="1" dur="indefinite" restart="never" nodeType="tmRoot"/>
+      </p:par>
+    </p:tnLst>
+  </p:timing>
 </p:sld>
 </file>
 
@@ -3233,7 +3240,7 @@
           <p:nvPr>
             <p:extLst>
               <p:ext uri="{D42A27DB-BD31-4B8C-83A1-F6EECF244321}">
-                <p14:modId xmlns:p14="http://schemas.microsoft.com/office/powerpoint/2010/main" val="2637845819"/>
+                <p14:modId xmlns:p14="http://schemas.microsoft.com/office/powerpoint/2010/main" val="2758082539"/>
               </p:ext>
             </p:extLst>
           </p:nvPr>
@@ -3405,10 +3412,18 @@
                     <a:p>
                       <a:pPr algn="ctr"/>
                       <a:r>
-                        <a:rPr lang="en-CA" sz="1400" dirty="0" err="1" smtClean="0"/>
+                        <a:rPr lang="en-CA" sz="1400" b="1" dirty="0" err="1" smtClean="0">
+                          <a:solidFill>
+                            <a:srgbClr val="00B050"/>
+                          </a:solidFill>
+                        </a:rPr>
                         <a:t>Udistan</a:t>
                       </a:r>
-                      <a:endParaRPr lang="en-US" sz="1400" dirty="0"/>
+                      <a:endParaRPr lang="en-US" sz="1400" b="1" dirty="0">
+                        <a:solidFill>
+                          <a:srgbClr val="00B050"/>
+                        </a:solidFill>
+                      </a:endParaRPr>
                     </a:p>
                   </a:txBody>
                   <a:tcPr anchor="ctr"/>
@@ -3470,10 +3485,18 @@
                     <a:p>
                       <a:pPr algn="ctr"/>
                       <a:r>
-                        <a:rPr lang="en-CA" sz="1400" dirty="0" err="1" smtClean="0"/>
+                        <a:rPr lang="en-CA" sz="1600" b="1" dirty="0" err="1" smtClean="0">
+                          <a:solidFill>
+                            <a:srgbClr val="00B050"/>
+                          </a:solidFill>
+                        </a:rPr>
                         <a:t>Gurnoor</a:t>
                       </a:r>
-                      <a:endParaRPr lang="en-US" sz="1400" dirty="0"/>
+                      <a:endParaRPr lang="en-US" sz="1600" b="1" dirty="0">
+                        <a:solidFill>
+                          <a:srgbClr val="00B050"/>
+                        </a:solidFill>
+                      </a:endParaRPr>
                     </a:p>
                   </a:txBody>
                   <a:tcPr anchor="ctr"/>
@@ -3570,10 +3593,18 @@
                     <a:p>
                       <a:pPr algn="ctr"/>
                       <a:r>
-                        <a:rPr lang="en-CA" sz="1400" dirty="0" err="1" smtClean="0"/>
+                        <a:rPr lang="en-CA" sz="1600" b="1" dirty="0" err="1" smtClean="0">
+                          <a:solidFill>
+                            <a:srgbClr val="00B050"/>
+                          </a:solidFill>
+                        </a:rPr>
                         <a:t>Helal</a:t>
                       </a:r>
-                      <a:endParaRPr lang="en-US" sz="1400" dirty="0"/>
+                      <a:endParaRPr lang="en-US" sz="1600" b="1" dirty="0">
+                        <a:solidFill>
+                          <a:srgbClr val="00B050"/>
+                        </a:solidFill>
+                      </a:endParaRPr>
                     </a:p>
                   </a:txBody>
                   <a:tcPr anchor="ctr"/>
@@ -3585,10 +3616,18 @@
                     <a:p>
                       <a:pPr algn="ctr"/>
                       <a:r>
-                        <a:rPr lang="en-CA" sz="1400" dirty="0" err="1" smtClean="0"/>
+                        <a:rPr lang="en-CA" sz="1600" b="1" dirty="0" err="1" smtClean="0">
+                          <a:solidFill>
+                            <a:srgbClr val="00B050"/>
+                          </a:solidFill>
+                        </a:rPr>
                         <a:t>Manveer</a:t>
                       </a:r>
-                      <a:endParaRPr lang="en-US" sz="1400" dirty="0"/>
+                      <a:endParaRPr lang="en-US" sz="1600" b="1" dirty="0">
+                        <a:solidFill>
+                          <a:srgbClr val="00B050"/>
+                        </a:solidFill>
+                      </a:endParaRPr>
                     </a:p>
                   </a:txBody>
                   <a:tcPr anchor="ctr"/>
@@ -3600,10 +3639,18 @@
                     <a:p>
                       <a:pPr algn="ctr"/>
                       <a:r>
-                        <a:rPr lang="en-CA" sz="1400" dirty="0" smtClean="0"/>
+                        <a:rPr lang="en-CA" sz="1800" dirty="0" smtClean="0">
+                          <a:solidFill>
+                            <a:srgbClr val="00B050"/>
+                          </a:solidFill>
+                        </a:rPr>
                         <a:t>Karman</a:t>
                       </a:r>
-                      <a:endParaRPr lang="en-US" sz="1400" dirty="0"/>
+                      <a:endParaRPr lang="en-US" sz="1800" dirty="0">
+                        <a:solidFill>
+                          <a:srgbClr val="00B050"/>
+                        </a:solidFill>
+                      </a:endParaRPr>
                     </a:p>
                   </a:txBody>
                   <a:tcPr anchor="ctr"/>
@@ -4023,6 +4070,13 @@
   <p:clrMapOvr>
     <a:masterClrMapping/>
   </p:clrMapOvr>
+  <p:timing>
+    <p:tnLst>
+      <p:par>
+        <p:cTn id="1" dur="indefinite" restart="never" nodeType="tmRoot"/>
+      </p:par>
+    </p:tnLst>
+  </p:timing>
 </p:sld>
 </file>
 
@@ -4255,6 +4309,13 @@
   <p:clrMapOvr>
     <a:masterClrMapping/>
   </p:clrMapOvr>
+  <p:timing>
+    <p:tnLst>
+      <p:par>
+        <p:cTn id="1" dur="indefinite" restart="never" nodeType="tmRoot"/>
+      </p:par>
+    </p:tnLst>
+  </p:timing>
 </p:sld>
 </file>
 

</xml_diff>